<commit_message>
Updated files for demonstration
</commit_message>
<xml_diff>
--- a/Runkeeper.pptx
+++ b/Runkeeper.pptx
@@ -843,7 +843,7 @@
           <a:p>
             <a:fld id="{FE9D00BE-C85C-49DC-8EDE-550071161D3E}" type="datetimeFigureOut">
               <a:rPr lang="nl-NL" smtClean="0"/>
-              <a:t>24-1-2016</a:t>
+              <a:t>15-4-2016</a:t>
             </a:fld>
             <a:endParaRPr lang="nl-NL"/>
           </a:p>
@@ -1094,7 +1094,7 @@
           <a:p>
             <a:fld id="{FE9D00BE-C85C-49DC-8EDE-550071161D3E}" type="datetimeFigureOut">
               <a:rPr lang="nl-NL" smtClean="0"/>
-              <a:t>24-1-2016</a:t>
+              <a:t>15-4-2016</a:t>
             </a:fld>
             <a:endParaRPr lang="nl-NL"/>
           </a:p>
@@ -1408,7 +1408,7 @@
           <a:p>
             <a:fld id="{FE9D00BE-C85C-49DC-8EDE-550071161D3E}" type="datetimeFigureOut">
               <a:rPr lang="nl-NL" smtClean="0"/>
-              <a:t>24-1-2016</a:t>
+              <a:t>15-4-2016</a:t>
             </a:fld>
             <a:endParaRPr lang="nl-NL"/>
           </a:p>
@@ -1749,7 +1749,7 @@
           <a:p>
             <a:fld id="{FE9D00BE-C85C-49DC-8EDE-550071161D3E}" type="datetimeFigureOut">
               <a:rPr lang="nl-NL" smtClean="0"/>
-              <a:t>24-1-2016</a:t>
+              <a:t>15-4-2016</a:t>
             </a:fld>
             <a:endParaRPr lang="nl-NL"/>
           </a:p>
@@ -2063,7 +2063,7 @@
           <a:p>
             <a:fld id="{FE9D00BE-C85C-49DC-8EDE-550071161D3E}" type="datetimeFigureOut">
               <a:rPr lang="nl-NL" smtClean="0"/>
-              <a:t>24-1-2016</a:t>
+              <a:t>15-4-2016</a:t>
             </a:fld>
             <a:endParaRPr lang="nl-NL"/>
           </a:p>
@@ -2456,7 +2456,7 @@
           <a:p>
             <a:fld id="{FE9D00BE-C85C-49DC-8EDE-550071161D3E}" type="datetimeFigureOut">
               <a:rPr lang="nl-NL" smtClean="0"/>
-              <a:t>24-1-2016</a:t>
+              <a:t>15-4-2016</a:t>
             </a:fld>
             <a:endParaRPr lang="nl-NL"/>
           </a:p>
@@ -2626,7 +2626,7 @@
           <a:p>
             <a:fld id="{FE9D00BE-C85C-49DC-8EDE-550071161D3E}" type="datetimeFigureOut">
               <a:rPr lang="nl-NL" smtClean="0"/>
-              <a:t>24-1-2016</a:t>
+              <a:t>15-4-2016</a:t>
             </a:fld>
             <a:endParaRPr lang="nl-NL"/>
           </a:p>
@@ -2806,7 +2806,7 @@
           <a:p>
             <a:fld id="{FE9D00BE-C85C-49DC-8EDE-550071161D3E}" type="datetimeFigureOut">
               <a:rPr lang="nl-NL" smtClean="0"/>
-              <a:t>24-1-2016</a:t>
+              <a:t>15-4-2016</a:t>
             </a:fld>
             <a:endParaRPr lang="nl-NL"/>
           </a:p>
@@ -2982,7 +2982,7 @@
           <a:p>
             <a:fld id="{FE9D00BE-C85C-49DC-8EDE-550071161D3E}" type="datetimeFigureOut">
               <a:rPr lang="nl-NL" smtClean="0"/>
-              <a:t>24-1-2016</a:t>
+              <a:t>15-4-2016</a:t>
             </a:fld>
             <a:endParaRPr lang="nl-NL"/>
           </a:p>
@@ -3229,7 +3229,7 @@
           <a:p>
             <a:fld id="{FE9D00BE-C85C-49DC-8EDE-550071161D3E}" type="datetimeFigureOut">
               <a:rPr lang="nl-NL" smtClean="0"/>
-              <a:t>24-1-2016</a:t>
+              <a:t>15-4-2016</a:t>
             </a:fld>
             <a:endParaRPr lang="nl-NL"/>
           </a:p>
@@ -3461,7 +3461,7 @@
           <a:p>
             <a:fld id="{FE9D00BE-C85C-49DC-8EDE-550071161D3E}" type="datetimeFigureOut">
               <a:rPr lang="nl-NL" smtClean="0"/>
-              <a:t>24-1-2016</a:t>
+              <a:t>15-4-2016</a:t>
             </a:fld>
             <a:endParaRPr lang="nl-NL"/>
           </a:p>
@@ -3835,7 +3835,7 @@
           <a:p>
             <a:fld id="{FE9D00BE-C85C-49DC-8EDE-550071161D3E}" type="datetimeFigureOut">
               <a:rPr lang="nl-NL" smtClean="0"/>
-              <a:t>24-1-2016</a:t>
+              <a:t>15-4-2016</a:t>
             </a:fld>
             <a:endParaRPr lang="nl-NL"/>
           </a:p>
@@ -3958,7 +3958,7 @@
           <a:p>
             <a:fld id="{FE9D00BE-C85C-49DC-8EDE-550071161D3E}" type="datetimeFigureOut">
               <a:rPr lang="nl-NL" smtClean="0"/>
-              <a:t>24-1-2016</a:t>
+              <a:t>15-4-2016</a:t>
             </a:fld>
             <a:endParaRPr lang="nl-NL"/>
           </a:p>
@@ -4053,7 +4053,7 @@
           <a:p>
             <a:fld id="{FE9D00BE-C85C-49DC-8EDE-550071161D3E}" type="datetimeFigureOut">
               <a:rPr lang="nl-NL" smtClean="0"/>
-              <a:t>24-1-2016</a:t>
+              <a:t>15-4-2016</a:t>
             </a:fld>
             <a:endParaRPr lang="nl-NL"/>
           </a:p>
@@ -4308,7 +4308,7 @@
           <a:p>
             <a:fld id="{FE9D00BE-C85C-49DC-8EDE-550071161D3E}" type="datetimeFigureOut">
               <a:rPr lang="nl-NL" smtClean="0"/>
-              <a:t>24-1-2016</a:t>
+              <a:t>15-4-2016</a:t>
             </a:fld>
             <a:endParaRPr lang="nl-NL"/>
           </a:p>
@@ -4571,7 +4571,7 @@
           <a:p>
             <a:fld id="{FE9D00BE-C85C-49DC-8EDE-550071161D3E}" type="datetimeFigureOut">
               <a:rPr lang="nl-NL" smtClean="0"/>
-              <a:t>24-1-2016</a:t>
+              <a:t>15-4-2016</a:t>
             </a:fld>
             <a:endParaRPr lang="nl-NL"/>
           </a:p>
@@ -5314,7 +5314,7 @@
           <a:p>
             <a:fld id="{FE9D00BE-C85C-49DC-8EDE-550071161D3E}" type="datetimeFigureOut">
               <a:rPr lang="nl-NL" smtClean="0"/>
-              <a:t>24-1-2016</a:t>
+              <a:t>15-4-2016</a:t>
             </a:fld>
             <a:endParaRPr lang="nl-NL"/>
           </a:p>
@@ -6129,9 +6129,10 @@
           </a:p>
           <a:p>
             <a:r>
-              <a:rPr lang="nl-NL" dirty="0" smtClean="0"/>
-              <a:t>Feature Geofencing</a:t>
-            </a:r>
+              <a:rPr lang="nl-NL" dirty="0" err="1" smtClean="0"/>
+              <a:t>Geofencing</a:t>
+            </a:r>
+            <a:endParaRPr lang="nl-NL" dirty="0" smtClean="0"/>
           </a:p>
           <a:p>
             <a:endParaRPr lang="nl-NL" dirty="0" smtClean="0"/>
@@ -6801,8 +6802,8 @@
         </p:nvSpPr>
         <p:spPr>
           <a:xfrm>
-            <a:off x="1376438" y="227391"/>
-            <a:ext cx="7766936" cy="1646302"/>
+            <a:off x="1609351" y="267418"/>
+            <a:ext cx="7766936" cy="829897"/>
           </a:xfrm>
         </p:spPr>
         <p:txBody>
@@ -6818,41 +6819,78 @@
           </a:p>
         </p:txBody>
       </p:sp>
-      <p:sp>
-        <p:nvSpPr>
-          <p:cNvPr id="3" name="Ondertitel 2"/>
-          <p:cNvSpPr>
-            <a:spLocks noGrp="1"/>
-          </p:cNvSpPr>
-          <p:nvPr>
-            <p:ph type="subTitle" idx="1"/>
-          </p:nvPr>
-        </p:nvSpPr>
+      <p:pic>
+        <p:nvPicPr>
+          <p:cNvPr id="5" name="Afbeelding 4"/>
+          <p:cNvPicPr>
+            <a:picLocks noChangeAspect="1"/>
+          </p:cNvPicPr>
+          <p:nvPr/>
+        </p:nvPicPr>
+        <p:blipFill>
+          <a:blip r:embed="rId2"/>
+          <a:stretch>
+            <a:fillRect/>
+          </a:stretch>
+        </p:blipFill>
         <p:spPr>
           <a:xfrm>
-            <a:off x="1376438" y="2047861"/>
-            <a:ext cx="7766936" cy="1096899"/>
+            <a:off x="1216325" y="1428258"/>
+            <a:ext cx="2872043" cy="4501908"/>
           </a:xfrm>
+          <a:prstGeom prst="rect">
+            <a:avLst/>
+          </a:prstGeom>
         </p:spPr>
-        <p:txBody>
-          <a:bodyPr/>
-          <a:lstStyle/>
-          <a:p>
-            <a:pPr marL="285750" indent="-285750" algn="l">
-              <a:buFont typeface="Wingdings" panose="05000000000000000000" pitchFamily="2" charset="2"/>
-              <a:buChar char="Ø"/>
-            </a:pPr>
-            <a:r>
-              <a:rPr lang="nl-NL" dirty="0" smtClean="0"/>
-              <a:t>Feature </a:t>
-            </a:r>
-          </a:p>
-          <a:p>
-            <a:pPr algn="l"/>
-            <a:endParaRPr lang="nl-NL" dirty="0"/>
-          </a:p>
-        </p:txBody>
-      </p:sp>
+      </p:pic>
+      <p:pic>
+        <p:nvPicPr>
+          <p:cNvPr id="6" name="Afbeelding 5"/>
+          <p:cNvPicPr>
+            <a:picLocks noChangeAspect="1"/>
+          </p:cNvPicPr>
+          <p:nvPr/>
+        </p:nvPicPr>
+        <p:blipFill>
+          <a:blip r:embed="rId3"/>
+          <a:stretch>
+            <a:fillRect/>
+          </a:stretch>
+        </p:blipFill>
+        <p:spPr>
+          <a:xfrm>
+            <a:off x="4364966" y="1169466"/>
+            <a:ext cx="6918385" cy="2987988"/>
+          </a:xfrm>
+          <a:prstGeom prst="rect">
+            <a:avLst/>
+          </a:prstGeom>
+        </p:spPr>
+      </p:pic>
+      <p:pic>
+        <p:nvPicPr>
+          <p:cNvPr id="7" name="Afbeelding 6"/>
+          <p:cNvPicPr>
+            <a:picLocks noChangeAspect="1"/>
+          </p:cNvPicPr>
+          <p:nvPr/>
+        </p:nvPicPr>
+        <p:blipFill>
+          <a:blip r:embed="rId4"/>
+          <a:stretch>
+            <a:fillRect/>
+          </a:stretch>
+        </p:blipFill>
+        <p:spPr>
+          <a:xfrm>
+            <a:off x="4364966" y="4267982"/>
+            <a:ext cx="3769833" cy="2508294"/>
+          </a:xfrm>
+          <a:prstGeom prst="rect">
+            <a:avLst/>
+          </a:prstGeom>
+        </p:spPr>
+      </p:pic>
     </p:spTree>
     <p:extLst>
       <p:ext uri="{BB962C8B-B14F-4D97-AF65-F5344CB8AC3E}">

</xml_diff>